<commit_message>
power point for internal demo
</commit_message>
<xml_diff>
--- a/Capstone2_Tableau_pp.pptx
+++ b/Capstone2_Tableau_pp.pptx
@@ -263,7 +263,7 @@
           <a:p>
             <a:fld id="{EED1C14C-A143-42F5-B247-D0E800131009}" type="datetimeFigureOut">
               <a:rPr lang="en-US" smtClean="0"/>
-              <a:t>6/18/2020</a:t>
+              <a:t>6/19/2020</a:t>
             </a:fld>
             <a:endParaRPr lang="en-US"/>
           </a:p>
@@ -461,7 +461,7 @@
           <a:p>
             <a:fld id="{EED1C14C-A143-42F5-B247-D0E800131009}" type="datetimeFigureOut">
               <a:rPr lang="en-US" smtClean="0"/>
-              <a:t>6/18/2020</a:t>
+              <a:t>6/19/2020</a:t>
             </a:fld>
             <a:endParaRPr lang="en-US"/>
           </a:p>
@@ -669,7 +669,7 @@
           <a:p>
             <a:fld id="{EED1C14C-A143-42F5-B247-D0E800131009}" type="datetimeFigureOut">
               <a:rPr lang="en-US" smtClean="0"/>
-              <a:t>6/18/2020</a:t>
+              <a:t>6/19/2020</a:t>
             </a:fld>
             <a:endParaRPr lang="en-US"/>
           </a:p>
@@ -867,7 +867,7 @@
           <a:p>
             <a:fld id="{EED1C14C-A143-42F5-B247-D0E800131009}" type="datetimeFigureOut">
               <a:rPr lang="en-US" smtClean="0"/>
-              <a:t>6/18/2020</a:t>
+              <a:t>6/19/2020</a:t>
             </a:fld>
             <a:endParaRPr lang="en-US"/>
           </a:p>
@@ -1142,7 +1142,7 @@
           <a:p>
             <a:fld id="{EED1C14C-A143-42F5-B247-D0E800131009}" type="datetimeFigureOut">
               <a:rPr lang="en-US" smtClean="0"/>
-              <a:t>6/18/2020</a:t>
+              <a:t>6/19/2020</a:t>
             </a:fld>
             <a:endParaRPr lang="en-US"/>
           </a:p>
@@ -1407,7 +1407,7 @@
           <a:p>
             <a:fld id="{EED1C14C-A143-42F5-B247-D0E800131009}" type="datetimeFigureOut">
               <a:rPr lang="en-US" smtClean="0"/>
-              <a:t>6/18/2020</a:t>
+              <a:t>6/19/2020</a:t>
             </a:fld>
             <a:endParaRPr lang="en-US"/>
           </a:p>
@@ -1819,7 +1819,7 @@
           <a:p>
             <a:fld id="{EED1C14C-A143-42F5-B247-D0E800131009}" type="datetimeFigureOut">
               <a:rPr lang="en-US" smtClean="0"/>
-              <a:t>6/18/2020</a:t>
+              <a:t>6/19/2020</a:t>
             </a:fld>
             <a:endParaRPr lang="en-US"/>
           </a:p>
@@ -1960,7 +1960,7 @@
           <a:p>
             <a:fld id="{EED1C14C-A143-42F5-B247-D0E800131009}" type="datetimeFigureOut">
               <a:rPr lang="en-US" smtClean="0"/>
-              <a:t>6/18/2020</a:t>
+              <a:t>6/19/2020</a:t>
             </a:fld>
             <a:endParaRPr lang="en-US"/>
           </a:p>
@@ -2073,7 +2073,7 @@
           <a:p>
             <a:fld id="{EED1C14C-A143-42F5-B247-D0E800131009}" type="datetimeFigureOut">
               <a:rPr lang="en-US" smtClean="0"/>
-              <a:t>6/18/2020</a:t>
+              <a:t>6/19/2020</a:t>
             </a:fld>
             <a:endParaRPr lang="en-US"/>
           </a:p>
@@ -2384,7 +2384,7 @@
           <a:p>
             <a:fld id="{EED1C14C-A143-42F5-B247-D0E800131009}" type="datetimeFigureOut">
               <a:rPr lang="en-US" smtClean="0"/>
-              <a:t>6/18/2020</a:t>
+              <a:t>6/19/2020</a:t>
             </a:fld>
             <a:endParaRPr lang="en-US"/>
           </a:p>
@@ -2672,7 +2672,7 @@
           <a:p>
             <a:fld id="{EED1C14C-A143-42F5-B247-D0E800131009}" type="datetimeFigureOut">
               <a:rPr lang="en-US" smtClean="0"/>
-              <a:t>6/18/2020</a:t>
+              <a:t>6/19/2020</a:t>
             </a:fld>
             <a:endParaRPr lang="en-US"/>
           </a:p>
@@ -2913,7 +2913,7 @@
           <a:p>
             <a:fld id="{EED1C14C-A143-42F5-B247-D0E800131009}" type="datetimeFigureOut">
               <a:rPr lang="en-US" smtClean="0"/>
-              <a:t>6/18/2020</a:t>
+              <a:t>6/19/2020</a:t>
             </a:fld>
             <a:endParaRPr lang="en-US"/>
           </a:p>

</xml_diff>